<commit_message>
Added slides to quarto/beginning-with-quarto
</commit_message>
<xml_diff>
--- a/quarto/beginning-with-quarto.pptx
+++ b/quarto/beginning-with-quarto.pptx
@@ -5,7 +5,7 @@
     <p:sldMasterId id="2147483648" r:id="rId1"/>
   </p:sldMasterIdLst>
   <p:notesMasterIdLst>
-    <p:notesMasterId r:id="rId7"/>
+    <p:notesMasterId r:id="rId10"/>
   </p:notesMasterIdLst>
   <p:sldIdLst>
     <p:sldId id="256" r:id="rId2"/>
@@ -13,6 +13,9 @@
     <p:sldId id="258" r:id="rId4"/>
     <p:sldId id="259" r:id="rId5"/>
     <p:sldId id="260" r:id="rId6"/>
+    <p:sldId id="261" r:id="rId7"/>
+    <p:sldId id="262" r:id="rId8"/>
+    <p:sldId id="263" r:id="rId9"/>
   </p:sldIdLst>
   <p:sldSz cx="9144000" cy="5143500" type="screen16x9"/>
   <p:notesSz cx="6858000" cy="9144000"/>
@@ -528,7 +531,35 @@
             </a:pPr>
             <a:r>
               <a:rPr/>
-              <a:t>Quarto enables you to weave together content and executable code into a finished presentation. To learn more about Quarto presentations see https://quarto.org/docs/presentations/.</a:t>
+              <a:t>Quarto is a markup language. That means that it uses simple text tags and codes. Quarto allows you to weave documentation, code, and output into a single file.</a:t>
+            </a:r>
+          </a:p>
+          <a:p>
+            <a:pPr lvl="0" indent="0" marL="0">
+              <a:buNone/>
+            </a:pPr>
+          </a:p>
+          <a:p>
+            <a:pPr lvl="0" indent="0" marL="0">
+              <a:buNone/>
+            </a:pPr>
+            <a:r>
+              <a:rPr/>
+              <a:t>This allows you to reach an ideal known as literate programming. Literate programming is a style of programming first defined by Donald Knuth in 1984. It uses explanations about how a program works in natural language with short snippets of code in between that can all be compiled and run as a single unit.</a:t>
+            </a:r>
+          </a:p>
+          <a:p>
+            <a:pPr lvl="0" indent="0" marL="0">
+              <a:buNone/>
+            </a:pPr>
+          </a:p>
+          <a:p>
+            <a:pPr lvl="0" indent="0" marL="0">
+              <a:buNone/>
+            </a:pPr>
+            <a:r>
+              <a:rPr/>
+              <a:t>https://en.wikipedia.org/wiki/Literate_programming</a:t>
             </a:r>
           </a:p>
         </p:txBody>
@@ -610,6 +641,362 @@
             </a:pPr>
             <a:r>
               <a:rPr/>
+              <a:t>Quarto uses pandoc, an open source system for translating among different documentation formats. Quarto uses Pandoc to create Word documents, pdf files, web pages (html). It can also produce presentations using Powerpoint, reveal.js, and beamer. With additional packages it can produce blogs, website, and even entire books.</a:t>
+            </a:r>
+          </a:p>
+          <a:p>
+            <a:pPr lvl="0" indent="0" marL="0">
+              <a:buNone/>
+            </a:pPr>
+          </a:p>
+          <a:p>
+            <a:pPr lvl="0" indent="0" marL="0">
+              <a:buNone/>
+            </a:pPr>
+            <a:r>
+              <a:rPr/>
+              <a:t>You can extend and modify the quarto system using lua filters. Lua filters take intermediate output in the pandoc system, abstract syntax tree (ast) files, and makes modifications at that stage. This allows you to make global changes to how output from pandoc is displayed.</a:t>
+            </a:r>
+          </a:p>
+        </p:txBody>
+      </p:sp>
+      <p:sp>
+        <p:nvSpPr>
+          <p:cNvPr id="4" name="Slide Number Placeholder 3"/>
+          <p:cNvSpPr>
+            <a:spLocks noGrp="1"/>
+          </p:cNvSpPr>
+          <p:nvPr>
+            <p:ph type="sldNum" sz="quarter" idx="10"/>
+          </p:nvPr>
+        </p:nvSpPr>
+        <p:spPr/>
+        <p:txBody>
+          <a:bodyPr/>
+          <a:lstStyle/>
+          <a:p>
+            <a:fld id="{18BDFEC3-8487-43E8-A154-7C12CBC1FFF2}" type="slidenum">
+              <a:rPr lang="en-US"/>
+              <a:t>3</a:t>
+            </a:fld>
+            <a:endParaRPr lang="en-US"/>
+          </a:p>
+        </p:txBody>
+      </p:sp>
+    </p:spTree>
+  </p:cSld>
+</p:notes>
+</file>
+
+<file path=ppt/notesSlides/notesSlide3.xml><?xml version="1.0" encoding="utf-8"?>
+<p:notes xmlns:a="http://schemas.openxmlformats.org/drawingml/2006/main" xmlns:r="http://schemas.openxmlformats.org/officeDocument/2006/relationships" xmlns:p="http://schemas.openxmlformats.org/presentationml/2006/main">
+  <p:cSld>
+    <p:spTree>
+      <p:nvGrpSpPr>
+        <p:cNvPr id="1" name=""/>
+        <p:cNvGrpSpPr/>
+        <p:nvPr/>
+      </p:nvGrpSpPr>
+      <p:grpSpPr>
+        <a:xfrm>
+          <a:off x="0" y="0"/>
+          <a:ext cx="0" cy="0"/>
+          <a:chOff x="0" y="0"/>
+          <a:chExt cx="0" cy="0"/>
+        </a:xfrm>
+      </p:grpSpPr>
+      <p:sp>
+        <p:nvSpPr>
+          <p:cNvPr id="2" name="Slide Image Placeholder 1"/>
+          <p:cNvSpPr>
+            <a:spLocks noGrp="1" noRot="1" noChangeAspect="1"/>
+          </p:cNvSpPr>
+          <p:nvPr>
+            <p:ph type="sldImg"/>
+          </p:nvPr>
+        </p:nvSpPr>
+        <p:spPr/>
+      </p:sp>
+      <p:sp>
+        <p:nvSpPr>
+          <p:cNvPr id="3" name="Notes Placeholder 2"/>
+          <p:cNvSpPr>
+            <a:spLocks noGrp="1"/>
+          </p:cNvSpPr>
+          <p:nvPr>
+            <p:ph type="body" idx="1"/>
+          </p:nvPr>
+        </p:nvSpPr>
+        <p:spPr/>
+        <p:txBody>
+          <a:bodyPr/>
+          <a:lstStyle/>
+          <a:p>
+            <a:pPr lvl="0" indent="0" marL="0">
+              <a:buNone/>
+            </a:pPr>
+            <a:r>
+              <a:rPr/>
+              <a:t>The biggest distinction between quarto and earlier markup languages: Rmarkdown and JUpyter is that quarto does not require you to have R or Python installed before you use it. So you can start with quarto without having to commit to an underlying program ahead of time.</a:t>
+            </a:r>
+          </a:p>
+          <a:p>
+            <a:pPr lvl="0" indent="0" marL="0">
+              <a:buNone/>
+            </a:pPr>
+          </a:p>
+          <a:p>
+            <a:pPr lvl="0" indent="0" marL="0">
+              <a:buNone/>
+            </a:pPr>
+            <a:r>
+              <a:rPr/>
+              <a:t>Quarto supports multiple rendering options, including knitr, an R based system, or Jupyter, a Python based system, or Observable, a Javascript based system.</a:t>
+            </a:r>
+          </a:p>
+        </p:txBody>
+      </p:sp>
+      <p:sp>
+        <p:nvSpPr>
+          <p:cNvPr id="4" name="Slide Number Placeholder 3"/>
+          <p:cNvSpPr>
+            <a:spLocks noGrp="1"/>
+          </p:cNvSpPr>
+          <p:nvPr>
+            <p:ph type="sldNum" sz="quarter" idx="10"/>
+          </p:nvPr>
+        </p:nvSpPr>
+        <p:spPr/>
+        <p:txBody>
+          <a:bodyPr/>
+          <a:lstStyle/>
+          <a:p>
+            <a:fld id="{18BDFEC3-8487-43E8-A154-7C12CBC1FFF2}" type="slidenum">
+              <a:rPr lang="en-US"/>
+              <a:t>4</a:t>
+            </a:fld>
+            <a:endParaRPr lang="en-US"/>
+          </a:p>
+        </p:txBody>
+      </p:sp>
+    </p:spTree>
+  </p:cSld>
+</p:notes>
+</file>
+
+<file path=ppt/notesSlides/notesSlide4.xml><?xml version="1.0" encoding="utf-8"?>
+<p:notes xmlns:a="http://schemas.openxmlformats.org/drawingml/2006/main" xmlns:r="http://schemas.openxmlformats.org/officeDocument/2006/relationships" xmlns:p="http://schemas.openxmlformats.org/presentationml/2006/main">
+  <p:cSld>
+    <p:spTree>
+      <p:nvGrpSpPr>
+        <p:cNvPr id="1" name=""/>
+        <p:cNvGrpSpPr/>
+        <p:nvPr/>
+      </p:nvGrpSpPr>
+      <p:grpSpPr>
+        <a:xfrm>
+          <a:off x="0" y="0"/>
+          <a:ext cx="0" cy="0"/>
+          <a:chOff x="0" y="0"/>
+          <a:chExt cx="0" cy="0"/>
+        </a:xfrm>
+      </p:grpSpPr>
+      <p:sp>
+        <p:nvSpPr>
+          <p:cNvPr id="2" name="Slide Image Placeholder 1"/>
+          <p:cNvSpPr>
+            <a:spLocks noGrp="1" noRot="1" noChangeAspect="1"/>
+          </p:cNvSpPr>
+          <p:nvPr>
+            <p:ph type="sldImg"/>
+          </p:nvPr>
+        </p:nvSpPr>
+        <p:spPr/>
+      </p:sp>
+      <p:sp>
+        <p:nvSpPr>
+          <p:cNvPr id="3" name="Notes Placeholder 2"/>
+          <p:cNvSpPr>
+            <a:spLocks noGrp="1"/>
+          </p:cNvSpPr>
+          <p:nvPr>
+            <p:ph type="body" idx="1"/>
+          </p:nvPr>
+        </p:nvSpPr>
+        <p:spPr/>
+        <p:txBody>
+          <a:bodyPr/>
+          <a:lstStyle/>
+          <a:p>
+            <a:pPr lvl="0" indent="0" marL="0">
+              <a:buNone/>
+            </a:pPr>
+            <a:r>
+              <a:rPr/>
+              <a:t>Quarto allows you to place math equations using Latex code</a:t>
+            </a:r>
+          </a:p>
+        </p:txBody>
+      </p:sp>
+      <p:sp>
+        <p:nvSpPr>
+          <p:cNvPr id="4" name="Slide Number Placeholder 3"/>
+          <p:cNvSpPr>
+            <a:spLocks noGrp="1"/>
+          </p:cNvSpPr>
+          <p:nvPr>
+            <p:ph type="sldNum" sz="quarter" idx="10"/>
+          </p:nvPr>
+        </p:nvSpPr>
+        <p:spPr/>
+        <p:txBody>
+          <a:bodyPr/>
+          <a:lstStyle/>
+          <a:p>
+            <a:fld id="{18BDFEC3-8487-43E8-A154-7C12CBC1FFF2}" type="slidenum">
+              <a:rPr lang="en-US"/>
+              <a:t>5</a:t>
+            </a:fld>
+            <a:endParaRPr lang="en-US"/>
+          </a:p>
+        </p:txBody>
+      </p:sp>
+    </p:spTree>
+  </p:cSld>
+</p:notes>
+</file>
+
+<file path=ppt/notesSlides/notesSlide5.xml><?xml version="1.0" encoding="utf-8"?>
+<p:notes xmlns:a="http://schemas.openxmlformats.org/drawingml/2006/main" xmlns:r="http://schemas.openxmlformats.org/officeDocument/2006/relationships" xmlns:p="http://schemas.openxmlformats.org/presentationml/2006/main">
+  <p:cSld>
+    <p:spTree>
+      <p:nvGrpSpPr>
+        <p:cNvPr id="1" name=""/>
+        <p:cNvGrpSpPr/>
+        <p:nvPr/>
+      </p:nvGrpSpPr>
+      <p:grpSpPr>
+        <a:xfrm>
+          <a:off x="0" y="0"/>
+          <a:ext cx="0" cy="0"/>
+          <a:chOff x="0" y="0"/>
+          <a:chExt cx="0" cy="0"/>
+        </a:xfrm>
+      </p:grpSpPr>
+      <p:sp>
+        <p:nvSpPr>
+          <p:cNvPr id="2" name="Slide Image Placeholder 1"/>
+          <p:cNvSpPr>
+            <a:spLocks noGrp="1" noRot="1" noChangeAspect="1"/>
+          </p:cNvSpPr>
+          <p:nvPr>
+            <p:ph type="sldImg"/>
+          </p:nvPr>
+        </p:nvSpPr>
+        <p:spPr/>
+      </p:sp>
+      <p:sp>
+        <p:nvSpPr>
+          <p:cNvPr id="3" name="Notes Placeholder 2"/>
+          <p:cNvSpPr>
+            <a:spLocks noGrp="1"/>
+          </p:cNvSpPr>
+          <p:nvPr>
+            <p:ph type="body" idx="1"/>
+          </p:nvPr>
+        </p:nvSpPr>
+        <p:spPr/>
+        <p:txBody>
+          <a:bodyPr/>
+          <a:lstStyle/>
+          <a:p>
+            <a:pPr lvl="0" indent="0" marL="0">
+              <a:buNone/>
+            </a:pPr>
+            <a:r>
+              <a:rPr/>
+              <a:t>You can place text and images in multiple columns.</a:t>
+            </a:r>
+          </a:p>
+        </p:txBody>
+      </p:sp>
+      <p:sp>
+        <p:nvSpPr>
+          <p:cNvPr id="4" name="Slide Number Placeholder 3"/>
+          <p:cNvSpPr>
+            <a:spLocks noGrp="1"/>
+          </p:cNvSpPr>
+          <p:nvPr>
+            <p:ph type="sldNum" sz="quarter" idx="10"/>
+          </p:nvPr>
+        </p:nvSpPr>
+        <p:spPr/>
+        <p:txBody>
+          <a:bodyPr/>
+          <a:lstStyle/>
+          <a:p>
+            <a:fld id="{18BDFEC3-8487-43E8-A154-7C12CBC1FFF2}" type="slidenum">
+              <a:rPr lang="en-US"/>
+              <a:t>7</a:t>
+            </a:fld>
+            <a:endParaRPr lang="en-US"/>
+          </a:p>
+        </p:txBody>
+      </p:sp>
+    </p:spTree>
+  </p:cSld>
+</p:notes>
+</file>
+
+<file path=ppt/notesSlides/notesSlide6.xml><?xml version="1.0" encoding="utf-8"?>
+<p:notes xmlns:a="http://schemas.openxmlformats.org/drawingml/2006/main" xmlns:r="http://schemas.openxmlformats.org/officeDocument/2006/relationships" xmlns:p="http://schemas.openxmlformats.org/presentationml/2006/main">
+  <p:cSld>
+    <p:spTree>
+      <p:nvGrpSpPr>
+        <p:cNvPr id="1" name=""/>
+        <p:cNvGrpSpPr/>
+        <p:nvPr/>
+      </p:nvGrpSpPr>
+      <p:grpSpPr>
+        <a:xfrm>
+          <a:off x="0" y="0"/>
+          <a:ext cx="0" cy="0"/>
+          <a:chOff x="0" y="0"/>
+          <a:chExt cx="0" cy="0"/>
+        </a:xfrm>
+      </p:grpSpPr>
+      <p:sp>
+        <p:nvSpPr>
+          <p:cNvPr id="2" name="Slide Image Placeholder 1"/>
+          <p:cNvSpPr>
+            <a:spLocks noGrp="1" noRot="1" noChangeAspect="1"/>
+          </p:cNvSpPr>
+          <p:nvPr>
+            <p:ph type="sldImg"/>
+          </p:nvPr>
+        </p:nvSpPr>
+        <p:spPr/>
+      </p:sp>
+      <p:sp>
+        <p:nvSpPr>
+          <p:cNvPr id="3" name="Notes Placeholder 2"/>
+          <p:cNvSpPr>
+            <a:spLocks noGrp="1"/>
+          </p:cNvSpPr>
+          <p:nvPr>
+            <p:ph type="body" idx="1"/>
+          </p:nvPr>
+        </p:nvSpPr>
+        <p:spPr/>
+        <p:txBody>
+          <a:bodyPr/>
+          <a:lstStyle/>
+          <a:p>
+            <a:pPr lvl="0" indent="0" marL="0">
+              <a:buNone/>
+            </a:pPr>
+            <a:r>
+              <a:rPr/>
               <a:t>Program chunks behave similarly. A new feature in both Rmarkdown and Quarto is the placement of chunk information inside the chunk itself using the hashtag vertical bar.</a:t>
             </a:r>
           </a:p>
@@ -632,7 +1019,7 @@
           <a:p>
             <a:fld id="{18BDFEC3-8487-43E8-A154-7C12CBC1FFF2}" type="slidenum">
               <a:rPr lang="en-US"/>
-              <a:t>5</a:t>
+              <a:t>8</a:t>
             </a:fld>
             <a:endParaRPr lang="en-US"/>
           </a:p>
@@ -3714,7 +4101,7 @@
             </a:pPr>
             <a:r>
               <a:rPr/>
-              <a:t>what is Quarto?</a:t>
+              <a:t>What is Quarto?</a:t>
             </a:r>
           </a:p>
         </p:txBody>
@@ -3752,13 +4139,6 @@
             <a:r>
               <a:rPr/>
               <a:t>Literate programming</a:t>
-            </a:r>
-          </a:p>
-          <a:p>
-            <a:pPr lvl="0"/>
-            <a:r>
-              <a:rPr/>
-              <a:t>Based on pandoc</a:t>
             </a:r>
           </a:p>
         </p:txBody>
@@ -3805,7 +4185,7 @@
             </a:pPr>
             <a:r>
               <a:rPr/>
-              <a:t>Differences from R Markdown?</a:t>
+              <a:t>Built upon pandoc</a:t>
             </a:r>
           </a:p>
         </p:txBody>
@@ -3828,35 +4208,49 @@
             <a:pPr lvl="0"/>
             <a:r>
               <a:rPr/>
-              <a:t>Will run without R installed</a:t>
+              <a:t>Open source standard</a:t>
             </a:r>
           </a:p>
           <a:p>
             <a:pPr lvl="0"/>
             <a:r>
               <a:rPr/>
-              <a:t>Supports multiple rendering options</a:t>
+              <a:t>Creates multiple formats</a:t>
             </a:r>
           </a:p>
           <a:p>
             <a:pPr lvl="1"/>
             <a:r>
               <a:rPr/>
-              <a:t>knitr</a:t>
+              <a:t>Word, pdf, html</a:t>
             </a:r>
           </a:p>
           <a:p>
             <a:pPr lvl="1"/>
             <a:r>
               <a:rPr/>
-              <a:t>Jupyter</a:t>
+              <a:t>Powerpoint, reveal.js, beamer</a:t>
             </a:r>
           </a:p>
           <a:p>
             <a:pPr lvl="1"/>
             <a:r>
               <a:rPr/>
-              <a:t>Observable</a:t>
+              <a:t>Blogs, static websites</a:t>
+            </a:r>
+          </a:p>
+          <a:p>
+            <a:pPr lvl="1"/>
+            <a:r>
+              <a:rPr/>
+              <a:t>Books (bookdown)</a:t>
+            </a:r>
+          </a:p>
+          <a:p>
+            <a:pPr lvl="0"/>
+            <a:r>
+              <a:rPr/>
+              <a:t>Extensible using lua filters</a:t>
             </a:r>
           </a:p>
         </p:txBody>
@@ -3903,7 +4297,105 @@
             </a:pPr>
             <a:r>
               <a:rPr/>
-              <a:t>Similarities to R Markdown: Math</a:t>
+              <a:t>Differences from earlier markup languages</a:t>
+            </a:r>
+          </a:p>
+        </p:txBody>
+      </p:sp>
+      <p:sp>
+        <p:nvSpPr>
+          <p:cNvPr id="3" name="Content Placeholder 2"/>
+          <p:cNvSpPr>
+            <a:spLocks noGrp="1"/>
+          </p:cNvSpPr>
+          <p:nvPr>
+            <p:ph idx="1"/>
+          </p:nvPr>
+        </p:nvSpPr>
+        <p:spPr/>
+        <p:txBody>
+          <a:bodyPr/>
+          <a:lstStyle/>
+          <a:p>
+            <a:pPr lvl="0"/>
+            <a:r>
+              <a:rPr/>
+              <a:t>Will run without R or Python installed</a:t>
+            </a:r>
+          </a:p>
+          <a:p>
+            <a:pPr lvl="0"/>
+            <a:r>
+              <a:rPr/>
+              <a:t>Supports multiple rendering options</a:t>
+            </a:r>
+          </a:p>
+          <a:p>
+            <a:pPr lvl="1"/>
+            <a:r>
+              <a:rPr/>
+              <a:t>knitr</a:t>
+            </a:r>
+          </a:p>
+          <a:p>
+            <a:pPr lvl="1"/>
+            <a:r>
+              <a:rPr/>
+              <a:t>Jupyter</a:t>
+            </a:r>
+          </a:p>
+          <a:p>
+            <a:pPr lvl="1"/>
+            <a:r>
+              <a:rPr/>
+              <a:t>Observable</a:t>
+            </a:r>
+          </a:p>
+        </p:txBody>
+      </p:sp>
+    </p:spTree>
+  </p:cSld>
+</p:sld>
+</file>
+
+<file path=ppt/slides/slide5.xml><?xml version="1.0" encoding="utf-8"?>
+<p:sld xmlns:a="http://schemas.openxmlformats.org/drawingml/2006/main" xmlns:r="http://schemas.openxmlformats.org/officeDocument/2006/relationships" xmlns:p="http://schemas.openxmlformats.org/presentationml/2006/main">
+  <p:cSld>
+    <p:spTree>
+      <p:nvGrpSpPr>
+        <p:cNvPr id="1" name=""/>
+        <p:cNvGrpSpPr/>
+        <p:nvPr/>
+      </p:nvGrpSpPr>
+      <p:grpSpPr>
+        <a:xfrm>
+          <a:off x="0" y="0"/>
+          <a:ext cx="0" cy="0"/>
+          <a:chOff x="0" y="0"/>
+          <a:chExt cx="0" cy="0"/>
+        </a:xfrm>
+      </p:grpSpPr>
+      <p:sp>
+        <p:nvSpPr>
+          <p:cNvPr id="2" name="Title 1"/>
+          <p:cNvSpPr>
+            <a:spLocks noGrp="1"/>
+          </p:cNvSpPr>
+          <p:nvPr>
+            <p:ph type="title"/>
+          </p:nvPr>
+        </p:nvSpPr>
+        <p:spPr/>
+        <p:txBody>
+          <a:bodyPr/>
+          <a:lstStyle/>
+          <a:p>
+            <a:pPr lvl="0" indent="0" marL="0">
+              <a:buNone/>
+            </a:pPr>
+            <a:r>
+              <a:rPr/>
+              <a:t>Similarities to earlier markdown systems: Math</a:t>
             </a:r>
           </a:p>
         </p:txBody>
@@ -4039,7 +4531,7 @@
 </p:sld>
 </file>
 
-<file path=ppt/slides/slide5.xml><?xml version="1.0" encoding="utf-8"?>
+<file path=ppt/slides/slide6.xml><?xml version="1.0" encoding="utf-8"?>
 <p:sld xmlns:a="http://schemas.openxmlformats.org/drawingml/2006/main" xmlns:r="http://schemas.openxmlformats.org/officeDocument/2006/relationships" xmlns:p="http://schemas.openxmlformats.org/presentationml/2006/main">
   <p:cSld>
     <p:spTree>
@@ -4076,11 +4568,130 @@
             </a:pPr>
             <a:r>
               <a:rPr/>
+              <a:t>Multi-column layout</a:t>
+            </a:r>
+          </a:p>
+        </p:txBody>
+      </p:sp>
+    </p:spTree>
+  </p:cSld>
+</p:sld>
+</file>
+
+<file path=ppt/slides/slide7.xml><?xml version="1.0" encoding="utf-8"?>
+<p:sld xmlns:a="http://schemas.openxmlformats.org/drawingml/2006/main" xmlns:r="http://schemas.openxmlformats.org/officeDocument/2006/relationships" xmlns:p="http://schemas.openxmlformats.org/presentationml/2006/main">
+  <p:cSld>
+    <p:spTree>
+      <p:nvGrpSpPr>
+        <p:cNvPr id="1" name=""/>
+        <p:cNvGrpSpPr/>
+        <p:nvPr/>
+      </p:nvGrpSpPr>
+      <p:grpSpPr>
+        <a:xfrm>
+          <a:off x="0" y="0"/>
+          <a:ext cx="0" cy="0"/>
+          <a:chOff x="0" y="0"/>
+          <a:chExt cx="0" cy="0"/>
+        </a:xfrm>
+      </p:grpSpPr>
+      <p:sp>
+        <p:nvSpPr>
+          <p:cNvPr id="2" name="Title 1"/>
+          <p:cNvSpPr>
+            <a:spLocks noGrp="1"/>
+          </p:cNvSpPr>
+          <p:nvPr>
+            <p:ph type="title"/>
+          </p:nvPr>
+        </p:nvSpPr>
+        <p:spPr/>
+        <p:txBody>
+          <a:bodyPr/>
+          <a:lstStyle/>
+          <a:p>
+            <a:pPr lvl="0" indent="0" marL="0">
+              <a:buNone/>
+            </a:pPr>
+            <a:r>
+              <a:rPr/>
               <a:t>Program chunks</a:t>
             </a:r>
           </a:p>
         </p:txBody>
       </p:sp>
+      <p:sp>
+        <p:nvSpPr>
+          <p:cNvPr id="3" name="Content Placeholder 2"/>
+          <p:cNvSpPr>
+            <a:spLocks noGrp="1"/>
+          </p:cNvSpPr>
+          <p:nvPr>
+            <p:ph idx="1" sz="half"/>
+          </p:nvPr>
+        </p:nvSpPr>
+        <p:spPr/>
+        <p:txBody>
+          <a:bodyPr/>
+          <a:lstStyle/>
+          <a:p>
+            <a:pPr lvl="0" indent="0" marL="0">
+              <a:buNone/>
+            </a:pPr>
+            <a:r>
+              <a:rPr/>
+              <a:t>Left column</a:t>
+            </a:r>
+          </a:p>
+        </p:txBody>
+      </p:sp>
+      <p:sp>
+        <p:nvSpPr>
+          <p:cNvPr id="4" name="Content Placeholder 3"/>
+          <p:cNvSpPr>
+            <a:spLocks noGrp="1"/>
+          </p:cNvSpPr>
+          <p:nvPr>
+            <p:ph idx="2" sz="half"/>
+          </p:nvPr>
+        </p:nvSpPr>
+        <p:spPr/>
+        <p:txBody>
+          <a:bodyPr/>
+          <a:lstStyle/>
+          <a:p>
+            <a:pPr lvl="0" indent="0" marL="0">
+              <a:buNone/>
+            </a:pPr>
+            <a:r>
+              <a:rPr/>
+              <a:t>Right column</a:t>
+            </a:r>
+          </a:p>
+        </p:txBody>
+      </p:sp>
+    </p:spTree>
+  </p:cSld>
+</p:sld>
+</file>
+
+<file path=ppt/slides/slide8.xml><?xml version="1.0" encoding="utf-8"?>
+<p:sld xmlns:a="http://schemas.openxmlformats.org/drawingml/2006/main" xmlns:r="http://schemas.openxmlformats.org/officeDocument/2006/relationships" xmlns:p="http://schemas.openxmlformats.org/presentationml/2006/main">
+  <p:cSld>
+    <p:spTree>
+      <p:nvGrpSpPr>
+        <p:cNvPr id="1" name=""/>
+        <p:cNvGrpSpPr/>
+        <p:nvPr/>
+      </p:nvGrpSpPr>
+      <p:grpSpPr>
+        <a:xfrm>
+          <a:off x="0" y="0"/>
+          <a:ext cx="0" cy="0"/>
+          <a:chOff x="0" y="0"/>
+          <a:chExt cx="0" cy="0"/>
+        </a:xfrm>
+      </p:grpSpPr>
       <p:sp>
         <p:nvSpPr>
           <p:cNvPr id="3" name="Content Placeholder 2"/>
@@ -4144,8 +4755,8 @@
               <a:rPr>
                 <a:latin typeface="Courier"/>
               </a:rPr>
-              <a:t> [1] -0.16838365  0.03149493  0.22108913 -0.20461990 -2.08794785  0.60737576
- [7] -2.45520511 -0.48397538  1.90711909 -0.61055994</a:t>
+              <a:t> [1] -0.6661704  0.6881186 -0.7148814  0.3122933  0.6330162 -0.7081723
+ [7]  0.2710122  0.4526055 -0.9616422  0.4118844</a:t>
             </a:r>
           </a:p>
         </p:txBody>

</xml_diff>